<commit_message>
Changed file structure for HTML, updated funtionality, workable status
</commit_message>
<xml_diff>
--- a/Airbnb Predictor.pptx
+++ b/Airbnb Predictor.pptx
@@ -14,23 +14,26 @@
     <p:sldId id="259" r:id="rId9"/>
     <p:sldId id="260" r:id="rId10"/>
     <p:sldId id="261" r:id="rId11"/>
+    <p:sldId id="262" r:id="rId12"/>
+    <p:sldId id="263" r:id="rId13"/>
+    <p:sldId id="264" r:id="rId14"/>
   </p:sldIdLst>
   <p:sldSz cy="5143500" cx="9144000"/>
   <p:notesSz cx="6858000" cy="9144000"/>
   <p:embeddedFontLst>
     <p:embeddedFont>
       <p:font typeface="Montserrat"/>
-      <p:regular r:id="rId12"/>
-      <p:bold r:id="rId13"/>
-      <p:italic r:id="rId14"/>
-      <p:boldItalic r:id="rId15"/>
+      <p:regular r:id="rId15"/>
+      <p:bold r:id="rId16"/>
+      <p:italic r:id="rId17"/>
+      <p:boldItalic r:id="rId18"/>
     </p:embeddedFont>
     <p:embeddedFont>
       <p:font typeface="Lato"/>
-      <p:regular r:id="rId16"/>
-      <p:bold r:id="rId17"/>
-      <p:italic r:id="rId18"/>
-      <p:boldItalic r:id="rId19"/>
+      <p:regular r:id="rId19"/>
+      <p:bold r:id="rId20"/>
+      <p:italic r:id="rId21"/>
+      <p:boldItalic r:id="rId22"/>
     </p:embeddedFont>
   </p:embeddedFontLst>
   <p:defaultTextStyle>
@@ -1023,7 +1026,7 @@
       </p:grpSpPr>
       <p:sp>
         <p:nvSpPr>
-          <p:cNvPr id="149" name="Google Shape;149;g17a160e8c8d_0_722:notes"/>
+          <p:cNvPr id="149" name="Google Shape;149;g17e81624578_0_6:notes"/>
           <p:cNvSpPr/>
           <p:nvPr>
             <p:ph idx="2" type="sldImg"/>
@@ -1058,7 +1061,7 @@
       </p:sp>
       <p:sp>
         <p:nvSpPr>
-          <p:cNvPr id="150" name="Google Shape;150;g17a160e8c8d_0_722:notes"/>
+          <p:cNvPr id="150" name="Google Shape;150;g17e81624578_0_6:notes"/>
           <p:cNvSpPr txBox="1"/>
           <p:nvPr>
             <p:ph idx="1" type="body"/>
@@ -1108,7 +1111,7 @@
   <p:cSld>
     <p:spTree>
       <p:nvGrpSpPr>
-        <p:cNvPr id="155" name="Shape 155"/>
+        <p:cNvPr id="156" name="Shape 156"/>
         <p:cNvGrpSpPr/>
         <p:nvPr/>
       </p:nvGrpSpPr>
@@ -1122,7 +1125,7 @@
       </p:grpSpPr>
       <p:sp>
         <p:nvSpPr>
-          <p:cNvPr id="156" name="Google Shape;156;g12ba70a57c9_0_1:notes"/>
+          <p:cNvPr id="157" name="Google Shape;157;g17e81624578_0_0:notes"/>
           <p:cNvSpPr/>
           <p:nvPr>
             <p:ph idx="2" type="sldImg"/>
@@ -1157,7 +1160,7 @@
       </p:sp>
       <p:sp>
         <p:nvSpPr>
-          <p:cNvPr id="157" name="Google Shape;157;g12ba70a57c9_0_1:notes"/>
+          <p:cNvPr id="158" name="Google Shape;158;g17e81624578_0_0:notes"/>
           <p:cNvSpPr txBox="1"/>
           <p:nvPr>
             <p:ph idx="1" type="body"/>
@@ -1207,7 +1210,7 @@
   <p:cSld>
     <p:spTree>
       <p:nvGrpSpPr>
-        <p:cNvPr id="162" name="Shape 162"/>
+        <p:cNvPr id="164" name="Shape 164"/>
         <p:cNvGrpSpPr/>
         <p:nvPr/>
       </p:nvGrpSpPr>
@@ -1221,7 +1224,7 @@
       </p:grpSpPr>
       <p:sp>
         <p:nvSpPr>
-          <p:cNvPr id="163" name="Google Shape;163;g12ba70a57c9_0_7:notes"/>
+          <p:cNvPr id="165" name="Google Shape;165;g17a160e8c8d_0_722:notes"/>
           <p:cNvSpPr/>
           <p:nvPr>
             <p:ph idx="2" type="sldImg"/>
@@ -1256,7 +1259,304 @@
       </p:sp>
       <p:sp>
         <p:nvSpPr>
-          <p:cNvPr id="164" name="Google Shape;164;g12ba70a57c9_0_7:notes"/>
+          <p:cNvPr id="166" name="Google Shape;166;g17a160e8c8d_0_722:notes"/>
+          <p:cNvSpPr txBox="1"/>
+          <p:nvPr>
+            <p:ph idx="1" type="body"/>
+          </p:nvPr>
+        </p:nvSpPr>
+        <p:spPr>
+          <a:xfrm>
+            <a:off x="685800" y="4343400"/>
+            <a:ext cx="5486400" cy="4114800"/>
+          </a:xfrm>
+          <a:prstGeom prst="rect">
+            <a:avLst/>
+          </a:prstGeom>
+        </p:spPr>
+        <p:txBody>
+          <a:bodyPr anchorCtr="0" anchor="t" bIns="91425" lIns="91425" spcFirstLastPara="1" rIns="91425" wrap="square" tIns="91425">
+            <a:noAutofit/>
+          </a:bodyPr>
+          <a:lstStyle/>
+          <a:p>
+            <a:pPr indent="0" lvl="0" marL="0" rtl="0" algn="l">
+              <a:spcBef>
+                <a:spcPts val="0"/>
+              </a:spcBef>
+              <a:spcAft>
+                <a:spcPts val="0"/>
+              </a:spcAft>
+              <a:buNone/>
+            </a:pPr>
+            <a:r>
+              <a:t/>
+            </a:r>
+            <a:endParaRPr/>
+          </a:p>
+        </p:txBody>
+      </p:sp>
+    </p:spTree>
+  </p:cSld>
+  <p:clrMapOvr>
+    <a:masterClrMapping/>
+  </p:clrMapOvr>
+</p:notes>
+</file>
+
+<file path=ppt/notesSlides/notesSlide7.xml><?xml version="1.0" encoding="utf-8"?>
+<p:notes xmlns:a="http://schemas.openxmlformats.org/drawingml/2006/main" xmlns:r="http://schemas.openxmlformats.org/officeDocument/2006/relationships" xmlns:mc="http://schemas.openxmlformats.org/markup-compatibility/2006" xmlns:mv="urn:schemas-microsoft-com:mac:vml" xmlns:p="http://schemas.openxmlformats.org/presentationml/2006/main" xmlns:c="http://schemas.openxmlformats.org/drawingml/2006/chart" xmlns:dgm="http://schemas.openxmlformats.org/drawingml/2006/diagram" xmlns:o="urn:schemas-microsoft-com:office:office" xmlns:v="urn:schemas-microsoft-com:vml" xmlns:pvml="urn:schemas-microsoft-com:office:powerpoint" xmlns:com="http://schemas.openxmlformats.org/drawingml/2006/compatibility" xmlns:p14="http://schemas.microsoft.com/office/powerpoint/2010/main" xmlns:p15="http://schemas.microsoft.com/office/powerpoint/2012/main" xmlns:ahyp="http://schemas.microsoft.com/office/drawing/2018/hyperlinkcolor" showMasterPhAnim="0" showMasterSp="0">
+  <p:cSld>
+    <p:spTree>
+      <p:nvGrpSpPr>
+        <p:cNvPr id="172" name="Shape 172"/>
+        <p:cNvGrpSpPr/>
+        <p:nvPr/>
+      </p:nvGrpSpPr>
+      <p:grpSpPr>
+        <a:xfrm>
+          <a:off x="0" y="0"/>
+          <a:ext cx="0" cy="0"/>
+          <a:chOff x="0" y="0"/>
+          <a:chExt cx="0" cy="0"/>
+        </a:xfrm>
+      </p:grpSpPr>
+      <p:sp>
+        <p:nvSpPr>
+          <p:cNvPr id="173" name="Google Shape;173;g12ba70a57c9_0_1:notes"/>
+          <p:cNvSpPr/>
+          <p:nvPr>
+            <p:ph idx="2" type="sldImg"/>
+          </p:nvPr>
+        </p:nvSpPr>
+        <p:spPr>
+          <a:xfrm>
+            <a:off x="381300" y="685800"/>
+            <a:ext cx="6096000" cy="3429000"/>
+          </a:xfrm>
+          <a:custGeom>
+            <a:rect b="b" l="l" r="r" t="t"/>
+            <a:pathLst>
+              <a:path extrusionOk="0" h="120000" w="120000">
+                <a:moveTo>
+                  <a:pt x="0" y="0"/>
+                </a:moveTo>
+                <a:lnTo>
+                  <a:pt x="120000" y="0"/>
+                </a:lnTo>
+                <a:lnTo>
+                  <a:pt x="120000" y="120000"/>
+                </a:lnTo>
+                <a:lnTo>
+                  <a:pt x="0" y="120000"/>
+                </a:lnTo>
+                <a:close/>
+              </a:path>
+            </a:pathLst>
+          </a:custGeom>
+        </p:spPr>
+      </p:sp>
+      <p:sp>
+        <p:nvSpPr>
+          <p:cNvPr id="174" name="Google Shape;174;g12ba70a57c9_0_1:notes"/>
+          <p:cNvSpPr txBox="1"/>
+          <p:nvPr>
+            <p:ph idx="1" type="body"/>
+          </p:nvPr>
+        </p:nvSpPr>
+        <p:spPr>
+          <a:xfrm>
+            <a:off x="685800" y="4343400"/>
+            <a:ext cx="5486400" cy="4114800"/>
+          </a:xfrm>
+          <a:prstGeom prst="rect">
+            <a:avLst/>
+          </a:prstGeom>
+        </p:spPr>
+        <p:txBody>
+          <a:bodyPr anchorCtr="0" anchor="t" bIns="91425" lIns="91425" spcFirstLastPara="1" rIns="91425" wrap="square" tIns="91425">
+            <a:noAutofit/>
+          </a:bodyPr>
+          <a:lstStyle/>
+          <a:p>
+            <a:pPr indent="0" lvl="0" marL="0" rtl="0" algn="l">
+              <a:spcBef>
+                <a:spcPts val="0"/>
+              </a:spcBef>
+              <a:spcAft>
+                <a:spcPts val="0"/>
+              </a:spcAft>
+              <a:buNone/>
+            </a:pPr>
+            <a:r>
+              <a:t/>
+            </a:r>
+            <a:endParaRPr/>
+          </a:p>
+        </p:txBody>
+      </p:sp>
+    </p:spTree>
+  </p:cSld>
+  <p:clrMapOvr>
+    <a:masterClrMapping/>
+  </p:clrMapOvr>
+</p:notes>
+</file>
+
+<file path=ppt/notesSlides/notesSlide8.xml><?xml version="1.0" encoding="utf-8"?>
+<p:notes xmlns:a="http://schemas.openxmlformats.org/drawingml/2006/main" xmlns:r="http://schemas.openxmlformats.org/officeDocument/2006/relationships" xmlns:mc="http://schemas.openxmlformats.org/markup-compatibility/2006" xmlns:mv="urn:schemas-microsoft-com:mac:vml" xmlns:p="http://schemas.openxmlformats.org/presentationml/2006/main" xmlns:c="http://schemas.openxmlformats.org/drawingml/2006/chart" xmlns:dgm="http://schemas.openxmlformats.org/drawingml/2006/diagram" xmlns:o="urn:schemas-microsoft-com:office:office" xmlns:v="urn:schemas-microsoft-com:vml" xmlns:pvml="urn:schemas-microsoft-com:office:powerpoint" xmlns:com="http://schemas.openxmlformats.org/drawingml/2006/compatibility" xmlns:p14="http://schemas.microsoft.com/office/powerpoint/2010/main" xmlns:p15="http://schemas.microsoft.com/office/powerpoint/2012/main" xmlns:ahyp="http://schemas.microsoft.com/office/drawing/2018/hyperlinkcolor" showMasterPhAnim="0" showMasterSp="0">
+  <p:cSld>
+    <p:spTree>
+      <p:nvGrpSpPr>
+        <p:cNvPr id="179" name="Shape 179"/>
+        <p:cNvGrpSpPr/>
+        <p:nvPr/>
+      </p:nvGrpSpPr>
+      <p:grpSpPr>
+        <a:xfrm>
+          <a:off x="0" y="0"/>
+          <a:ext cx="0" cy="0"/>
+          <a:chOff x="0" y="0"/>
+          <a:chExt cx="0" cy="0"/>
+        </a:xfrm>
+      </p:grpSpPr>
+      <p:sp>
+        <p:nvSpPr>
+          <p:cNvPr id="180" name="Google Shape;180;g12ba70a57c9_0_7:notes"/>
+          <p:cNvSpPr/>
+          <p:nvPr>
+            <p:ph idx="2" type="sldImg"/>
+          </p:nvPr>
+        </p:nvSpPr>
+        <p:spPr>
+          <a:xfrm>
+            <a:off x="381300" y="685800"/>
+            <a:ext cx="6096000" cy="3429000"/>
+          </a:xfrm>
+          <a:custGeom>
+            <a:rect b="b" l="l" r="r" t="t"/>
+            <a:pathLst>
+              <a:path extrusionOk="0" h="120000" w="120000">
+                <a:moveTo>
+                  <a:pt x="0" y="0"/>
+                </a:moveTo>
+                <a:lnTo>
+                  <a:pt x="120000" y="0"/>
+                </a:lnTo>
+                <a:lnTo>
+                  <a:pt x="120000" y="120000"/>
+                </a:lnTo>
+                <a:lnTo>
+                  <a:pt x="0" y="120000"/>
+                </a:lnTo>
+                <a:close/>
+              </a:path>
+            </a:pathLst>
+          </a:custGeom>
+        </p:spPr>
+      </p:sp>
+      <p:sp>
+        <p:nvSpPr>
+          <p:cNvPr id="181" name="Google Shape;181;g12ba70a57c9_0_7:notes"/>
+          <p:cNvSpPr txBox="1"/>
+          <p:nvPr>
+            <p:ph idx="1" type="body"/>
+          </p:nvPr>
+        </p:nvSpPr>
+        <p:spPr>
+          <a:xfrm>
+            <a:off x="685800" y="4343400"/>
+            <a:ext cx="5486400" cy="4114800"/>
+          </a:xfrm>
+          <a:prstGeom prst="rect">
+            <a:avLst/>
+          </a:prstGeom>
+        </p:spPr>
+        <p:txBody>
+          <a:bodyPr anchorCtr="0" anchor="t" bIns="91425" lIns="91425" spcFirstLastPara="1" rIns="91425" wrap="square" tIns="91425">
+            <a:noAutofit/>
+          </a:bodyPr>
+          <a:lstStyle/>
+          <a:p>
+            <a:pPr indent="0" lvl="0" marL="0" rtl="0" algn="l">
+              <a:spcBef>
+                <a:spcPts val="0"/>
+              </a:spcBef>
+              <a:spcAft>
+                <a:spcPts val="0"/>
+              </a:spcAft>
+              <a:buNone/>
+            </a:pPr>
+            <a:r>
+              <a:t/>
+            </a:r>
+            <a:endParaRPr/>
+          </a:p>
+        </p:txBody>
+      </p:sp>
+    </p:spTree>
+  </p:cSld>
+  <p:clrMapOvr>
+    <a:masterClrMapping/>
+  </p:clrMapOvr>
+</p:notes>
+</file>
+
+<file path=ppt/notesSlides/notesSlide9.xml><?xml version="1.0" encoding="utf-8"?>
+<p:notes xmlns:a="http://schemas.openxmlformats.org/drawingml/2006/main" xmlns:r="http://schemas.openxmlformats.org/officeDocument/2006/relationships" xmlns:mc="http://schemas.openxmlformats.org/markup-compatibility/2006" xmlns:mv="urn:schemas-microsoft-com:mac:vml" xmlns:p="http://schemas.openxmlformats.org/presentationml/2006/main" xmlns:c="http://schemas.openxmlformats.org/drawingml/2006/chart" xmlns:dgm="http://schemas.openxmlformats.org/drawingml/2006/diagram" xmlns:o="urn:schemas-microsoft-com:office:office" xmlns:v="urn:schemas-microsoft-com:vml" xmlns:pvml="urn:schemas-microsoft-com:office:powerpoint" xmlns:com="http://schemas.openxmlformats.org/drawingml/2006/compatibility" xmlns:p14="http://schemas.microsoft.com/office/powerpoint/2010/main" xmlns:p15="http://schemas.microsoft.com/office/powerpoint/2012/main" xmlns:ahyp="http://schemas.microsoft.com/office/drawing/2018/hyperlinkcolor" showMasterPhAnim="0" showMasterSp="0">
+  <p:cSld>
+    <p:spTree>
+      <p:nvGrpSpPr>
+        <p:cNvPr id="186" name="Shape 186"/>
+        <p:cNvGrpSpPr/>
+        <p:nvPr/>
+      </p:nvGrpSpPr>
+      <p:grpSpPr>
+        <a:xfrm>
+          <a:off x="0" y="0"/>
+          <a:ext cx="0" cy="0"/>
+          <a:chOff x="0" y="0"/>
+          <a:chExt cx="0" cy="0"/>
+        </a:xfrm>
+      </p:grpSpPr>
+      <p:sp>
+        <p:nvSpPr>
+          <p:cNvPr id="187" name="Google Shape;187;g17e81624578_0_17:notes"/>
+          <p:cNvSpPr/>
+          <p:nvPr>
+            <p:ph idx="2" type="sldImg"/>
+          </p:nvPr>
+        </p:nvSpPr>
+        <p:spPr>
+          <a:xfrm>
+            <a:off x="381300" y="685800"/>
+            <a:ext cx="6096000" cy="3429000"/>
+          </a:xfrm>
+          <a:custGeom>
+            <a:rect b="b" l="l" r="r" t="t"/>
+            <a:pathLst>
+              <a:path extrusionOk="0" h="120000" w="120000">
+                <a:moveTo>
+                  <a:pt x="0" y="0"/>
+                </a:moveTo>
+                <a:lnTo>
+                  <a:pt x="120000" y="0"/>
+                </a:lnTo>
+                <a:lnTo>
+                  <a:pt x="120000" y="120000"/>
+                </a:lnTo>
+                <a:lnTo>
+                  <a:pt x="0" y="120000"/>
+                </a:lnTo>
+                <a:close/>
+              </a:path>
+            </a:pathLst>
+          </a:custGeom>
+        </p:spPr>
+      </p:sp>
+      <p:sp>
+        <p:nvSpPr>
+          <p:cNvPr id="188" name="Google Shape;188;g17e81624578_0_17:notes"/>
           <p:cNvSpPr txBox="1"/>
           <p:nvPr>
             <p:ph idx="1" type="body"/>
@@ -9934,7 +10234,7 @@
             </a:r>
             <a:r>
               <a:rPr lang="en" sz="1500"/>
-              <a:t>- SQL</a:t>
+              <a:t>- SQL and Postgres</a:t>
             </a:r>
             <a:endParaRPr sz="1500"/>
           </a:p>
@@ -9982,7 +10282,15 @@
             </a:r>
             <a:r>
               <a:rPr lang="en" sz="1500"/>
-              <a:t> - Flask and HTML</a:t>
+              <a:t> - Plotly / </a:t>
+            </a:r>
+            <a:r>
+              <a:rPr lang="en" sz="1500"/>
+              <a:t>Tableau </a:t>
+            </a:r>
+            <a:r>
+              <a:rPr lang="en" sz="1500"/>
+              <a:t>/ Flask-HTML</a:t>
             </a:r>
             <a:endParaRPr sz="1500"/>
           </a:p>
@@ -10047,15 +10355,185 @@
             </a:pPr>
             <a:r>
               <a:rPr lang="en" sz="3200"/>
-              <a:t>Main Page Dynamic Graph</a:t>
+              <a:t>Database Overview</a:t>
             </a:r>
-            <a:endParaRPr sz="3300"/>
+            <a:endParaRPr sz="3200"/>
           </a:p>
         </p:txBody>
       </p:sp>
       <p:sp>
         <p:nvSpPr>
           <p:cNvPr id="153" name="Google Shape;153;p16"/>
+          <p:cNvSpPr txBox="1"/>
+          <p:nvPr>
+            <p:ph idx="1" type="body"/>
+          </p:nvPr>
+        </p:nvSpPr>
+        <p:spPr>
+          <a:xfrm>
+            <a:off x="1297500" y="1567550"/>
+            <a:ext cx="2746500" cy="2911200"/>
+          </a:xfrm>
+          <a:prstGeom prst="rect">
+            <a:avLst/>
+          </a:prstGeom>
+        </p:spPr>
+        <p:txBody>
+          <a:bodyPr anchorCtr="0" anchor="t" bIns="91425" lIns="91425" spcFirstLastPara="1" rIns="91425" wrap="square" tIns="91425">
+            <a:normAutofit/>
+          </a:bodyPr>
+          <a:lstStyle/>
+          <a:p>
+            <a:pPr indent="0" lvl="0" marL="0" rtl="0" algn="l">
+              <a:spcBef>
+                <a:spcPts val="0"/>
+              </a:spcBef>
+              <a:spcAft>
+                <a:spcPts val="1200"/>
+              </a:spcAft>
+              <a:buNone/>
+            </a:pPr>
+            <a:r>
+              <a:t/>
+            </a:r>
+            <a:endParaRPr/>
+          </a:p>
+        </p:txBody>
+      </p:sp>
+      <p:pic>
+        <p:nvPicPr>
+          <p:cNvPr id="154" name="Google Shape;154;p16"/>
+          <p:cNvPicPr preferRelativeResize="0"/>
+          <p:nvPr/>
+        </p:nvPicPr>
+        <p:blipFill rotWithShape="1">
+          <a:blip r:embed="rId3">
+            <a:alphaModFix/>
+          </a:blip>
+          <a:srcRect b="0" l="0" r="0" t="0"/>
+          <a:stretch/>
+        </p:blipFill>
+        <p:spPr>
+          <a:xfrm>
+            <a:off x="1829300" y="977613"/>
+            <a:ext cx="5062548" cy="4091073"/>
+          </a:xfrm>
+          <a:prstGeom prst="rect">
+            <a:avLst/>
+          </a:prstGeom>
+          <a:noFill/>
+          <a:ln>
+            <a:noFill/>
+          </a:ln>
+        </p:spPr>
+      </p:pic>
+      <p:sp>
+        <p:nvSpPr>
+          <p:cNvPr id="155" name="Google Shape;155;p16"/>
+          <p:cNvSpPr txBox="1"/>
+          <p:nvPr>
+            <p:ph idx="2" type="body"/>
+          </p:nvPr>
+        </p:nvSpPr>
+        <p:spPr>
+          <a:xfrm>
+            <a:off x="4933221" y="1567550"/>
+            <a:ext cx="3403200" cy="2911200"/>
+          </a:xfrm>
+          <a:prstGeom prst="rect">
+            <a:avLst/>
+          </a:prstGeom>
+        </p:spPr>
+        <p:txBody>
+          <a:bodyPr anchorCtr="0" anchor="t" bIns="91425" lIns="91425" spcFirstLastPara="1" rIns="91425" wrap="square" tIns="91425">
+            <a:normAutofit/>
+          </a:bodyPr>
+          <a:lstStyle/>
+          <a:p>
+            <a:pPr indent="0" lvl="0" marL="0" rtl="0" algn="l">
+              <a:spcBef>
+                <a:spcPts val="0"/>
+              </a:spcBef>
+              <a:spcAft>
+                <a:spcPts val="1200"/>
+              </a:spcAft>
+              <a:buNone/>
+            </a:pPr>
+            <a:r>
+              <a:t/>
+            </a:r>
+            <a:endParaRPr/>
+          </a:p>
+        </p:txBody>
+      </p:sp>
+    </p:spTree>
+  </p:cSld>
+  <p:clrMapOvr>
+    <a:masterClrMapping/>
+  </p:clrMapOvr>
+</p:sld>
+</file>
+
+<file path=ppt/slides/slide5.xml><?xml version="1.0" encoding="utf-8"?>
+<p:sld xmlns:a="http://schemas.openxmlformats.org/drawingml/2006/main" xmlns:r="http://schemas.openxmlformats.org/officeDocument/2006/relationships" xmlns:mc="http://schemas.openxmlformats.org/markup-compatibility/2006" xmlns:mv="urn:schemas-microsoft-com:mac:vml" xmlns:p="http://schemas.openxmlformats.org/presentationml/2006/main" xmlns:c="http://schemas.openxmlformats.org/drawingml/2006/chart" xmlns:dgm="http://schemas.openxmlformats.org/drawingml/2006/diagram" xmlns:o="urn:schemas-microsoft-com:office:office" xmlns:v="urn:schemas-microsoft-com:vml" xmlns:pvml="urn:schemas-microsoft-com:office:powerpoint" xmlns:com="http://schemas.openxmlformats.org/drawingml/2006/compatibility" xmlns:p14="http://schemas.microsoft.com/office/powerpoint/2010/main" xmlns:p15="http://schemas.microsoft.com/office/powerpoint/2012/main" xmlns:ahyp="http://schemas.microsoft.com/office/drawing/2018/hyperlinkcolor">
+  <p:cSld>
+    <p:spTree>
+      <p:nvGrpSpPr>
+        <p:cNvPr id="159" name="Shape 159"/>
+        <p:cNvGrpSpPr/>
+        <p:nvPr/>
+      </p:nvGrpSpPr>
+      <p:grpSpPr>
+        <a:xfrm>
+          <a:off x="0" y="0"/>
+          <a:ext cx="0" cy="0"/>
+          <a:chOff x="0" y="0"/>
+          <a:chExt cx="0" cy="0"/>
+        </a:xfrm>
+      </p:grpSpPr>
+      <p:sp>
+        <p:nvSpPr>
+          <p:cNvPr id="160" name="Google Shape;160;p17"/>
+          <p:cNvSpPr txBox="1"/>
+          <p:nvPr>
+            <p:ph type="title"/>
+          </p:nvPr>
+        </p:nvSpPr>
+        <p:spPr>
+          <a:xfrm>
+            <a:off x="1297500" y="393750"/>
+            <a:ext cx="7038900" cy="914100"/>
+          </a:xfrm>
+          <a:prstGeom prst="rect">
+            <a:avLst/>
+          </a:prstGeom>
+        </p:spPr>
+        <p:txBody>
+          <a:bodyPr anchorCtr="0" anchor="t" bIns="91425" lIns="91425" spcFirstLastPara="1" rIns="91425" wrap="square" tIns="91425">
+            <a:normAutofit/>
+          </a:bodyPr>
+          <a:lstStyle/>
+          <a:p>
+            <a:pPr indent="0" lvl="0" marL="0" rtl="0" algn="l">
+              <a:spcBef>
+                <a:spcPts val="0"/>
+              </a:spcBef>
+              <a:spcAft>
+                <a:spcPts val="0"/>
+              </a:spcAft>
+              <a:buNone/>
+            </a:pPr>
+            <a:r>
+              <a:rPr lang="en" sz="3200"/>
+              <a:t>Machine Learning Model</a:t>
+            </a:r>
+            <a:endParaRPr sz="3200"/>
+          </a:p>
+        </p:txBody>
+      </p:sp>
+      <p:sp>
+        <p:nvSpPr>
+          <p:cNvPr id="161" name="Google Shape;161;p17"/>
           <p:cNvSpPr txBox="1"/>
           <p:nvPr>
             <p:ph idx="1" type="body"/>
@@ -10081,6 +10559,342 @@
                 <a:spcPts val="0"/>
               </a:spcBef>
               <a:spcAft>
+                <a:spcPts val="1200"/>
+              </a:spcAft>
+              <a:buNone/>
+            </a:pPr>
+            <a:r>
+              <a:t/>
+            </a:r>
+            <a:endParaRPr/>
+          </a:p>
+        </p:txBody>
+      </p:sp>
+      <p:sp>
+        <p:nvSpPr>
+          <p:cNvPr id="162" name="Google Shape;162;p17"/>
+          <p:cNvSpPr txBox="1"/>
+          <p:nvPr>
+            <p:ph idx="2" type="body"/>
+          </p:nvPr>
+        </p:nvSpPr>
+        <p:spPr>
+          <a:xfrm>
+            <a:off x="4781025" y="1369800"/>
+            <a:ext cx="3999600" cy="3063300"/>
+          </a:xfrm>
+          <a:prstGeom prst="rect">
+            <a:avLst/>
+          </a:prstGeom>
+        </p:spPr>
+        <p:txBody>
+          <a:bodyPr anchorCtr="0" anchor="t" bIns="91425" lIns="91425" spcFirstLastPara="1" rIns="91425" wrap="square" tIns="91425">
+            <a:noAutofit/>
+          </a:bodyPr>
+          <a:lstStyle/>
+          <a:p>
+            <a:pPr indent="-311943" lvl="0" marL="457200" rtl="0" algn="l">
+              <a:lnSpc>
+                <a:spcPct val="115000"/>
+              </a:lnSpc>
+              <a:spcBef>
+                <a:spcPts val="0"/>
+              </a:spcBef>
+              <a:spcAft>
+                <a:spcPts val="0"/>
+              </a:spcAft>
+              <a:buSzPts val="1313"/>
+              <a:buChar char="●"/>
+            </a:pPr>
+            <a:r>
+              <a:rPr lang="en" sz="1312"/>
+              <a:t>Currently using a linear regression because our target feature (Airbnb price) is a continuous variable.</a:t>
+            </a:r>
+            <a:endParaRPr sz="1312"/>
+          </a:p>
+          <a:p>
+            <a:pPr indent="-311943" lvl="0" marL="457200" rtl="0" algn="l">
+              <a:lnSpc>
+                <a:spcPct val="115000"/>
+              </a:lnSpc>
+              <a:spcBef>
+                <a:spcPts val="0"/>
+              </a:spcBef>
+              <a:spcAft>
+                <a:spcPts val="0"/>
+              </a:spcAft>
+              <a:buSzPts val="1313"/>
+              <a:buChar char="●"/>
+            </a:pPr>
+            <a:r>
+              <a:rPr lang="en" sz="1312"/>
+              <a:t>Preprocessing has involved the following:</a:t>
+            </a:r>
+            <a:endParaRPr sz="1312"/>
+          </a:p>
+          <a:p>
+            <a:pPr indent="-311943" lvl="1" marL="914400" rtl="0" algn="l">
+              <a:lnSpc>
+                <a:spcPct val="115000"/>
+              </a:lnSpc>
+              <a:spcBef>
+                <a:spcPts val="0"/>
+              </a:spcBef>
+              <a:spcAft>
+                <a:spcPts val="0"/>
+              </a:spcAft>
+              <a:buSzPts val="1313"/>
+              <a:buChar char="○"/>
+            </a:pPr>
+            <a:r>
+              <a:rPr lang="en" sz="1312"/>
+              <a:t>Deleting listings without reviews in the current year.</a:t>
+            </a:r>
+            <a:endParaRPr sz="1312"/>
+          </a:p>
+          <a:p>
+            <a:pPr indent="-311943" lvl="1" marL="914400" rtl="0" algn="l">
+              <a:lnSpc>
+                <a:spcPct val="115000"/>
+              </a:lnSpc>
+              <a:spcBef>
+                <a:spcPts val="0"/>
+              </a:spcBef>
+              <a:spcAft>
+                <a:spcPts val="0"/>
+              </a:spcAft>
+              <a:buSzPts val="1313"/>
+              <a:buChar char="○"/>
+            </a:pPr>
+            <a:r>
+              <a:rPr lang="en" sz="1312"/>
+              <a:t>Drop columns unnecessary for machine learning model:</a:t>
+            </a:r>
+            <a:endParaRPr sz="1312"/>
+          </a:p>
+          <a:p>
+            <a:pPr indent="-311943" lvl="2" marL="1371600" rtl="0" algn="l">
+              <a:lnSpc>
+                <a:spcPct val="115000"/>
+              </a:lnSpc>
+              <a:spcBef>
+                <a:spcPts val="0"/>
+              </a:spcBef>
+              <a:spcAft>
+                <a:spcPts val="0"/>
+              </a:spcAft>
+              <a:buSzPts val="1313"/>
+              <a:buChar char="■"/>
+            </a:pPr>
+            <a:r>
+              <a:rPr lang="en" sz="1312"/>
+              <a:t>Host_id</a:t>
+            </a:r>
+            <a:endParaRPr sz="1312"/>
+          </a:p>
+          <a:p>
+            <a:pPr indent="-311943" lvl="2" marL="1371600" rtl="0" algn="l">
+              <a:lnSpc>
+                <a:spcPct val="115000"/>
+              </a:lnSpc>
+              <a:spcBef>
+                <a:spcPts val="0"/>
+              </a:spcBef>
+              <a:spcAft>
+                <a:spcPts val="0"/>
+              </a:spcAft>
+              <a:buSzPts val="1313"/>
+              <a:buChar char="■"/>
+            </a:pPr>
+            <a:r>
+              <a:rPr lang="en" sz="1312"/>
+              <a:t>Latitude</a:t>
+            </a:r>
+            <a:endParaRPr sz="1312"/>
+          </a:p>
+          <a:p>
+            <a:pPr indent="-311943" lvl="2" marL="1371600" rtl="0" algn="l">
+              <a:lnSpc>
+                <a:spcPct val="115000"/>
+              </a:lnSpc>
+              <a:spcBef>
+                <a:spcPts val="0"/>
+              </a:spcBef>
+              <a:spcAft>
+                <a:spcPts val="0"/>
+              </a:spcAft>
+              <a:buSzPts val="1313"/>
+              <a:buChar char="■"/>
+            </a:pPr>
+            <a:r>
+              <a:rPr lang="en" sz="1312"/>
+              <a:t>Longitude</a:t>
+            </a:r>
+            <a:endParaRPr sz="1312"/>
+          </a:p>
+          <a:p>
+            <a:pPr indent="-311943" lvl="1" marL="914400" rtl="0" algn="l">
+              <a:lnSpc>
+                <a:spcPct val="115000"/>
+              </a:lnSpc>
+              <a:spcBef>
+                <a:spcPts val="0"/>
+              </a:spcBef>
+              <a:spcAft>
+                <a:spcPts val="0"/>
+              </a:spcAft>
+              <a:buSzPts val="1313"/>
+              <a:buChar char="○"/>
+            </a:pPr>
+            <a:r>
+              <a:rPr lang="en" sz="1312"/>
+              <a:t>Drop major outlier (listing with a price over $9k/night).</a:t>
+            </a:r>
+            <a:endParaRPr sz="1312"/>
+          </a:p>
+          <a:p>
+            <a:pPr indent="-311943" lvl="1" marL="914400" rtl="0" algn="l">
+              <a:lnSpc>
+                <a:spcPct val="115000"/>
+              </a:lnSpc>
+              <a:spcBef>
+                <a:spcPts val="0"/>
+              </a:spcBef>
+              <a:spcAft>
+                <a:spcPts val="0"/>
+              </a:spcAft>
+              <a:buSzPts val="1313"/>
+              <a:buChar char="○"/>
+            </a:pPr>
+            <a:r>
+              <a:rPr lang="en" sz="1312"/>
+              <a:t>Drop null values.</a:t>
+            </a:r>
+            <a:endParaRPr sz="1312"/>
+          </a:p>
+        </p:txBody>
+      </p:sp>
+      <p:pic>
+        <p:nvPicPr>
+          <p:cNvPr id="163" name="Google Shape;163;p17"/>
+          <p:cNvPicPr preferRelativeResize="0"/>
+          <p:nvPr/>
+        </p:nvPicPr>
+        <p:blipFill>
+          <a:blip r:embed="rId3">
+            <a:alphaModFix/>
+          </a:blip>
+          <a:stretch>
+            <a:fillRect/>
+          </a:stretch>
+        </p:blipFill>
+        <p:spPr>
+          <a:xfrm>
+            <a:off x="894225" y="1567550"/>
+            <a:ext cx="3403200" cy="2911201"/>
+          </a:xfrm>
+          <a:prstGeom prst="rect">
+            <a:avLst/>
+          </a:prstGeom>
+          <a:noFill/>
+          <a:ln>
+            <a:noFill/>
+          </a:ln>
+        </p:spPr>
+      </p:pic>
+    </p:spTree>
+  </p:cSld>
+  <p:clrMapOvr>
+    <a:masterClrMapping/>
+  </p:clrMapOvr>
+</p:sld>
+</file>
+
+<file path=ppt/slides/slide6.xml><?xml version="1.0" encoding="utf-8"?>
+<p:sld xmlns:a="http://schemas.openxmlformats.org/drawingml/2006/main" xmlns:r="http://schemas.openxmlformats.org/officeDocument/2006/relationships" xmlns:mc="http://schemas.openxmlformats.org/markup-compatibility/2006" xmlns:mv="urn:schemas-microsoft-com:mac:vml" xmlns:p="http://schemas.openxmlformats.org/presentationml/2006/main" xmlns:c="http://schemas.openxmlformats.org/drawingml/2006/chart" xmlns:dgm="http://schemas.openxmlformats.org/drawingml/2006/diagram" xmlns:o="urn:schemas-microsoft-com:office:office" xmlns:v="urn:schemas-microsoft-com:vml" xmlns:pvml="urn:schemas-microsoft-com:office:powerpoint" xmlns:com="http://schemas.openxmlformats.org/drawingml/2006/compatibility" xmlns:p14="http://schemas.microsoft.com/office/powerpoint/2010/main" xmlns:p15="http://schemas.microsoft.com/office/powerpoint/2012/main" xmlns:ahyp="http://schemas.microsoft.com/office/drawing/2018/hyperlinkcolor">
+  <p:cSld>
+    <p:spTree>
+      <p:nvGrpSpPr>
+        <p:cNvPr id="167" name="Shape 167"/>
+        <p:cNvGrpSpPr/>
+        <p:nvPr/>
+      </p:nvGrpSpPr>
+      <p:grpSpPr>
+        <a:xfrm>
+          <a:off x="0" y="0"/>
+          <a:ext cx="0" cy="0"/>
+          <a:chOff x="0" y="0"/>
+          <a:chExt cx="0" cy="0"/>
+        </a:xfrm>
+      </p:grpSpPr>
+      <p:sp>
+        <p:nvSpPr>
+          <p:cNvPr id="168" name="Google Shape;168;p18"/>
+          <p:cNvSpPr txBox="1"/>
+          <p:nvPr>
+            <p:ph type="title"/>
+          </p:nvPr>
+        </p:nvSpPr>
+        <p:spPr>
+          <a:xfrm>
+            <a:off x="1297500" y="393750"/>
+            <a:ext cx="7038900" cy="914100"/>
+          </a:xfrm>
+          <a:prstGeom prst="rect">
+            <a:avLst/>
+          </a:prstGeom>
+        </p:spPr>
+        <p:txBody>
+          <a:bodyPr anchorCtr="0" anchor="t" bIns="91425" lIns="91425" spcFirstLastPara="1" rIns="91425" wrap="square" tIns="91425">
+            <a:normAutofit/>
+          </a:bodyPr>
+          <a:lstStyle/>
+          <a:p>
+            <a:pPr indent="0" lvl="0" marL="0" rtl="0" algn="l">
+              <a:spcBef>
+                <a:spcPts val="0"/>
+              </a:spcBef>
+              <a:spcAft>
+                <a:spcPts val="0"/>
+              </a:spcAft>
+              <a:buNone/>
+            </a:pPr>
+            <a:r>
+              <a:rPr lang="en" sz="3200"/>
+              <a:t>Main Page Dynamic Graph</a:t>
+            </a:r>
+            <a:endParaRPr sz="3300"/>
+          </a:p>
+        </p:txBody>
+      </p:sp>
+      <p:sp>
+        <p:nvSpPr>
+          <p:cNvPr id="169" name="Google Shape;169;p18"/>
+          <p:cNvSpPr txBox="1"/>
+          <p:nvPr>
+            <p:ph idx="1" type="body"/>
+          </p:nvPr>
+        </p:nvSpPr>
+        <p:spPr>
+          <a:xfrm>
+            <a:off x="1297500" y="1567550"/>
+            <a:ext cx="3403200" cy="2911200"/>
+          </a:xfrm>
+          <a:prstGeom prst="rect">
+            <a:avLst/>
+          </a:prstGeom>
+        </p:spPr>
+        <p:txBody>
+          <a:bodyPr anchorCtr="0" anchor="t" bIns="91425" lIns="91425" spcFirstLastPara="1" rIns="91425" wrap="square" tIns="91425">
+            <a:normAutofit/>
+          </a:bodyPr>
+          <a:lstStyle/>
+          <a:p>
+            <a:pPr indent="0" lvl="0" marL="0" rtl="0" algn="l">
+              <a:spcBef>
+                <a:spcPts val="0"/>
+              </a:spcBef>
+              <a:spcAft>
                 <a:spcPts val="0"/>
               </a:spcAft>
               <a:buNone/>
@@ -10162,7 +10976,7 @@
             </a:pPr>
             <a:r>
               <a:rPr lang="en"/>
-              <a:t>Number of Reviews</a:t>
+              <a:t>Number of bedrooms</a:t>
             </a:r>
             <a:endParaRPr/>
           </a:p>
@@ -10187,7 +11001,7 @@
       </p:sp>
       <p:sp>
         <p:nvSpPr>
-          <p:cNvPr id="154" name="Google Shape;154;p16"/>
+          <p:cNvPr id="170" name="Google Shape;170;p18"/>
           <p:cNvSpPr txBox="1"/>
           <p:nvPr>
             <p:ph idx="2" type="body"/>
@@ -10225,6 +11039,34 @@
           </a:p>
         </p:txBody>
       </p:sp>
+      <p:pic>
+        <p:nvPicPr>
+          <p:cNvPr id="171" name="Google Shape;171;p18"/>
+          <p:cNvPicPr preferRelativeResize="0"/>
+          <p:nvPr/>
+        </p:nvPicPr>
+        <p:blipFill>
+          <a:blip r:embed="rId3">
+            <a:alphaModFix/>
+          </a:blip>
+          <a:stretch>
+            <a:fillRect/>
+          </a:stretch>
+        </p:blipFill>
+        <p:spPr>
+          <a:xfrm>
+            <a:off x="4700700" y="1663475"/>
+            <a:ext cx="4087899" cy="2083625"/>
+          </a:xfrm>
+          <a:prstGeom prst="rect">
+            <a:avLst/>
+          </a:prstGeom>
+          <a:noFill/>
+          <a:ln>
+            <a:noFill/>
+          </a:ln>
+        </p:spPr>
+      </p:pic>
     </p:spTree>
   </p:cSld>
   <p:clrMapOvr>
@@ -10233,12 +11075,12 @@
 </p:sld>
 </file>
 
-<file path=ppt/slides/slide5.xml><?xml version="1.0" encoding="utf-8"?>
+<file path=ppt/slides/slide7.xml><?xml version="1.0" encoding="utf-8"?>
 <p:sld xmlns:a="http://schemas.openxmlformats.org/drawingml/2006/main" xmlns:r="http://schemas.openxmlformats.org/officeDocument/2006/relationships" xmlns:mc="http://schemas.openxmlformats.org/markup-compatibility/2006" xmlns:mv="urn:schemas-microsoft-com:mac:vml" xmlns:p="http://schemas.openxmlformats.org/presentationml/2006/main" xmlns:c="http://schemas.openxmlformats.org/drawingml/2006/chart" xmlns:dgm="http://schemas.openxmlformats.org/drawingml/2006/diagram" xmlns:o="urn:schemas-microsoft-com:office:office" xmlns:v="urn:schemas-microsoft-com:vml" xmlns:pvml="urn:schemas-microsoft-com:office:powerpoint" xmlns:com="http://schemas.openxmlformats.org/drawingml/2006/compatibility" xmlns:p14="http://schemas.microsoft.com/office/powerpoint/2010/main" xmlns:p15="http://schemas.microsoft.com/office/powerpoint/2012/main" xmlns:ahyp="http://schemas.microsoft.com/office/drawing/2018/hyperlinkcolor">
   <p:cSld>
     <p:spTree>
       <p:nvGrpSpPr>
-        <p:cNvPr id="158" name="Shape 158"/>
+        <p:cNvPr id="175" name="Shape 175"/>
         <p:cNvGrpSpPr/>
         <p:nvPr/>
       </p:nvGrpSpPr>
@@ -10252,7 +11094,7 @@
       </p:grpSpPr>
       <p:sp>
         <p:nvSpPr>
-          <p:cNvPr id="159" name="Google Shape;159;p17"/>
+          <p:cNvPr id="176" name="Google Shape;176;p19"/>
           <p:cNvSpPr txBox="1"/>
           <p:nvPr>
             <p:ph type="title"/>
@@ -10292,16 +11134,16 @@
       </p:sp>
       <p:sp>
         <p:nvSpPr>
-          <p:cNvPr id="160" name="Google Shape;160;p17"/>
+          <p:cNvPr id="177" name="Google Shape;177;p19"/>
           <p:cNvSpPr txBox="1"/>
           <p:nvPr>
-            <p:ph idx="1" type="body"/>
+            <p:ph idx="2" type="body"/>
           </p:nvPr>
         </p:nvSpPr>
         <p:spPr>
           <a:xfrm>
-            <a:off x="1297500" y="1567550"/>
-            <a:ext cx="3403200" cy="2911200"/>
+            <a:off x="4933200" y="2334650"/>
+            <a:ext cx="3403200" cy="1377000"/>
           </a:xfrm>
           <a:prstGeom prst="rect">
             <a:avLst/>
@@ -10324,46 +11166,6 @@
             </a:pPr>
             <a:r>
               <a:rPr lang="en"/>
-              <a:t>[Screenshot goes here]</a:t>
-            </a:r>
-            <a:endParaRPr/>
-          </a:p>
-        </p:txBody>
-      </p:sp>
-      <p:sp>
-        <p:nvSpPr>
-          <p:cNvPr id="161" name="Google Shape;161;p17"/>
-          <p:cNvSpPr txBox="1"/>
-          <p:nvPr>
-            <p:ph idx="2" type="body"/>
-          </p:nvPr>
-        </p:nvSpPr>
-        <p:spPr>
-          <a:xfrm>
-            <a:off x="4933221" y="1567550"/>
-            <a:ext cx="3403200" cy="2911200"/>
-          </a:xfrm>
-          <a:prstGeom prst="rect">
-            <a:avLst/>
-          </a:prstGeom>
-        </p:spPr>
-        <p:txBody>
-          <a:bodyPr anchorCtr="0" anchor="t" bIns="91425" lIns="91425" spcFirstLastPara="1" rIns="91425" wrap="square" tIns="91425">
-            <a:normAutofit/>
-          </a:bodyPr>
-          <a:lstStyle/>
-          <a:p>
-            <a:pPr indent="0" lvl="0" marL="0" rtl="0" algn="l">
-              <a:spcBef>
-                <a:spcPts val="0"/>
-              </a:spcBef>
-              <a:spcAft>
-                <a:spcPts val="1200"/>
-              </a:spcAft>
-              <a:buNone/>
-            </a:pPr>
-            <a:r>
-              <a:rPr lang="en"/>
               <a:t>Users will </a:t>
             </a:r>
             <a:r>
@@ -10372,7 +11174,7 @@
             </a:r>
             <a:r>
               <a:rPr lang="en"/>
-              <a:t> data on their upcoming Airbnb. Once they click submit our program  will compare the user </a:t>
+              <a:t> data on their upcoming Airbnb. Once they click “submit” our program  will compare the user </a:t>
             </a:r>
             <a:r>
               <a:rPr lang="en"/>
@@ -10384,12 +11186,40 @@
             </a:r>
             <a:r>
               <a:rPr lang="en"/>
-              <a:t>accurate price point for the user.</a:t>
+              <a:t>accurate starting price point for the user.</a:t>
             </a:r>
             <a:endParaRPr/>
           </a:p>
         </p:txBody>
       </p:sp>
+      <p:pic>
+        <p:nvPicPr>
+          <p:cNvPr id="178" name="Google Shape;178;p19"/>
+          <p:cNvPicPr preferRelativeResize="0"/>
+          <p:nvPr/>
+        </p:nvPicPr>
+        <p:blipFill>
+          <a:blip r:embed="rId3">
+            <a:alphaModFix/>
+          </a:blip>
+          <a:stretch>
+            <a:fillRect/>
+          </a:stretch>
+        </p:blipFill>
+        <p:spPr>
+          <a:xfrm>
+            <a:off x="1110000" y="1555799"/>
+            <a:ext cx="3635701" cy="2785425"/>
+          </a:xfrm>
+          <a:prstGeom prst="rect">
+            <a:avLst/>
+          </a:prstGeom>
+          <a:noFill/>
+          <a:ln>
+            <a:noFill/>
+          </a:ln>
+        </p:spPr>
+      </p:pic>
     </p:spTree>
   </p:cSld>
   <p:clrMapOvr>
@@ -10398,12 +11228,12 @@
 </p:sld>
 </file>
 
-<file path=ppt/slides/slide6.xml><?xml version="1.0" encoding="utf-8"?>
+<file path=ppt/slides/slide8.xml><?xml version="1.0" encoding="utf-8"?>
 <p:sld xmlns:a="http://schemas.openxmlformats.org/drawingml/2006/main" xmlns:r="http://schemas.openxmlformats.org/officeDocument/2006/relationships" xmlns:mc="http://schemas.openxmlformats.org/markup-compatibility/2006" xmlns:mv="urn:schemas-microsoft-com:mac:vml" xmlns:p="http://schemas.openxmlformats.org/presentationml/2006/main" xmlns:c="http://schemas.openxmlformats.org/drawingml/2006/chart" xmlns:dgm="http://schemas.openxmlformats.org/drawingml/2006/diagram" xmlns:o="urn:schemas-microsoft-com:office:office" xmlns:v="urn:schemas-microsoft-com:vml" xmlns:pvml="urn:schemas-microsoft-com:office:powerpoint" xmlns:com="http://schemas.openxmlformats.org/drawingml/2006/compatibility" xmlns:p14="http://schemas.microsoft.com/office/powerpoint/2010/main" xmlns:p15="http://schemas.microsoft.com/office/powerpoint/2012/main" xmlns:ahyp="http://schemas.microsoft.com/office/drawing/2018/hyperlinkcolor">
   <p:cSld>
     <p:spTree>
       <p:nvGrpSpPr>
-        <p:cNvPr id="165" name="Shape 165"/>
+        <p:cNvPr id="182" name="Shape 182"/>
         <p:cNvGrpSpPr/>
         <p:nvPr/>
       </p:nvGrpSpPr>
@@ -10417,7 +11247,7 @@
       </p:grpSpPr>
       <p:sp>
         <p:nvSpPr>
-          <p:cNvPr id="166" name="Google Shape;166;p18"/>
+          <p:cNvPr id="183" name="Google Shape;183;p20"/>
           <p:cNvSpPr txBox="1"/>
           <p:nvPr>
             <p:ph type="title"/>
@@ -10457,7 +11287,7 @@
       </p:sp>
       <p:sp>
         <p:nvSpPr>
-          <p:cNvPr id="167" name="Google Shape;167;p18"/>
+          <p:cNvPr id="184" name="Google Shape;184;p20"/>
           <p:cNvSpPr txBox="1"/>
           <p:nvPr>
             <p:ph idx="1" type="body"/>
@@ -10465,8 +11295,8 @@
         </p:nvSpPr>
         <p:spPr>
           <a:xfrm>
-            <a:off x="1297500" y="1567550"/>
-            <a:ext cx="3403200" cy="2911200"/>
+            <a:off x="1297500" y="2521100"/>
+            <a:ext cx="3403200" cy="1004100"/>
           </a:xfrm>
           <a:prstGeom prst="rect">
             <a:avLst/>
@@ -10474,7 +11304,7 @@
         </p:spPr>
         <p:txBody>
           <a:bodyPr anchorCtr="0" anchor="t" bIns="91425" lIns="91425" spcFirstLastPara="1" rIns="91425" wrap="square" tIns="91425">
-            <a:normAutofit/>
+            <a:normAutofit lnSpcReduction="20000"/>
           </a:bodyPr>
           <a:lstStyle/>
           <a:p>
@@ -10497,7 +11327,7 @@
       </p:sp>
       <p:sp>
         <p:nvSpPr>
-          <p:cNvPr id="168" name="Google Shape;168;p18"/>
+          <p:cNvPr id="185" name="Google Shape;185;p20"/>
           <p:cNvSpPr txBox="1"/>
           <p:nvPr>
             <p:ph idx="2" type="body"/>
@@ -10511,6 +11341,15 @@
           <a:prstGeom prst="rect">
             <a:avLst/>
           </a:prstGeom>
+          <a:ln cap="flat" cmpd="sng" w="19050">
+            <a:solidFill>
+              <a:srgbClr val="000000"/>
+            </a:solidFill>
+            <a:prstDash val="solid"/>
+            <a:round/>
+            <a:headEnd len="sm" w="sm" type="none"/>
+            <a:tailEnd len="sm" w="sm" type="none"/>
+          </a:ln>
         </p:spPr>
         <p:txBody>
           <a:bodyPr anchorCtr="0" anchor="t" bIns="91425" lIns="91425" spcFirstLastPara="1" rIns="91425" wrap="square" tIns="91425">
@@ -10523,6 +11362,51 @@
                 <a:spcPts val="0"/>
               </a:spcBef>
               <a:spcAft>
+                <a:spcPts val="0"/>
+              </a:spcAft>
+              <a:buNone/>
+            </a:pPr>
+            <a:r>
+              <a:t/>
+            </a:r>
+            <a:endParaRPr/>
+          </a:p>
+          <a:p>
+            <a:pPr indent="0" lvl="0" marL="0" rtl="0" algn="l">
+              <a:spcBef>
+                <a:spcPts val="1200"/>
+              </a:spcBef>
+              <a:spcAft>
+                <a:spcPts val="0"/>
+              </a:spcAft>
+              <a:buNone/>
+            </a:pPr>
+            <a:r>
+              <a:t/>
+            </a:r>
+            <a:endParaRPr/>
+          </a:p>
+          <a:p>
+            <a:pPr indent="0" lvl="0" marL="0" rtl="0" algn="l">
+              <a:spcBef>
+                <a:spcPts val="1200"/>
+              </a:spcBef>
+              <a:spcAft>
+                <a:spcPts val="0"/>
+              </a:spcAft>
+              <a:buNone/>
+            </a:pPr>
+            <a:r>
+              <a:t/>
+            </a:r>
+            <a:endParaRPr/>
+          </a:p>
+          <a:p>
+            <a:pPr indent="0" lvl="0" marL="457200" rtl="0" algn="l">
+              <a:spcBef>
+                <a:spcPts val="1200"/>
+              </a:spcBef>
+              <a:spcAft>
                 <a:spcPts val="1200"/>
               </a:spcAft>
               <a:buNone/>
@@ -10530,6 +11414,71 @@
             <a:r>
               <a:rPr lang="en"/>
               <a:t>[Screenshot goes here]</a:t>
+            </a:r>
+            <a:endParaRPr/>
+          </a:p>
+        </p:txBody>
+      </p:sp>
+    </p:spTree>
+  </p:cSld>
+  <p:clrMapOvr>
+    <a:masterClrMapping/>
+  </p:clrMapOvr>
+</p:sld>
+</file>
+
+<file path=ppt/slides/slide9.xml><?xml version="1.0" encoding="utf-8"?>
+<p:sld xmlns:a="http://schemas.openxmlformats.org/drawingml/2006/main" xmlns:r="http://schemas.openxmlformats.org/officeDocument/2006/relationships" xmlns:mc="http://schemas.openxmlformats.org/markup-compatibility/2006" xmlns:mv="urn:schemas-microsoft-com:mac:vml" xmlns:p="http://schemas.openxmlformats.org/presentationml/2006/main" xmlns:c="http://schemas.openxmlformats.org/drawingml/2006/chart" xmlns:dgm="http://schemas.openxmlformats.org/drawingml/2006/diagram" xmlns:o="urn:schemas-microsoft-com:office:office" xmlns:v="urn:schemas-microsoft-com:vml" xmlns:pvml="urn:schemas-microsoft-com:office:powerpoint" xmlns:com="http://schemas.openxmlformats.org/drawingml/2006/compatibility" xmlns:p14="http://schemas.microsoft.com/office/powerpoint/2010/main" xmlns:p15="http://schemas.microsoft.com/office/powerpoint/2012/main" xmlns:ahyp="http://schemas.microsoft.com/office/drawing/2018/hyperlinkcolor">
+  <p:cSld>
+    <p:spTree>
+      <p:nvGrpSpPr>
+        <p:cNvPr id="189" name="Shape 189"/>
+        <p:cNvGrpSpPr/>
+        <p:nvPr/>
+      </p:nvGrpSpPr>
+      <p:grpSpPr>
+        <a:xfrm>
+          <a:off x="0" y="0"/>
+          <a:ext cx="0" cy="0"/>
+          <a:chOff x="0" y="0"/>
+          <a:chExt cx="0" cy="0"/>
+        </a:xfrm>
+      </p:grpSpPr>
+      <p:sp>
+        <p:nvSpPr>
+          <p:cNvPr id="190" name="Google Shape;190;p21"/>
+          <p:cNvSpPr txBox="1"/>
+          <p:nvPr>
+            <p:ph type="title"/>
+          </p:nvPr>
+        </p:nvSpPr>
+        <p:spPr>
+          <a:xfrm>
+            <a:off x="823850" y="2053000"/>
+            <a:ext cx="4587000" cy="1148700"/>
+          </a:xfrm>
+          <a:prstGeom prst="rect">
+            <a:avLst/>
+          </a:prstGeom>
+        </p:spPr>
+        <p:txBody>
+          <a:bodyPr anchorCtr="0" anchor="ctr" bIns="91425" lIns="91425" spcFirstLastPara="1" rIns="91425" wrap="square" tIns="91425">
+            <a:normAutofit/>
+          </a:bodyPr>
+          <a:lstStyle/>
+          <a:p>
+            <a:pPr indent="0" lvl="0" marL="0" rtl="0" algn="l">
+              <a:spcBef>
+                <a:spcPts val="0"/>
+              </a:spcBef>
+              <a:spcAft>
+                <a:spcPts val="0"/>
+              </a:spcAft>
+              <a:buNone/>
+            </a:pPr>
+            <a:r>
+              <a:rPr lang="en"/>
+              <a:t>The End</a:t>
             </a:r>
             <a:endParaRPr/>
           </a:p>

</xml_diff>